<commit_message>
(1) changed to food trucks; (2) changed from 4 to 3 food trucks; (3) location of food trucks changes every day
</commit_message>
<xml_diff>
--- a/stimuli/restaurants.pptx
+++ b/stimuli/restaurants.pptx
@@ -6870,14 +6870,7 @@
                   <a:latin typeface="ADAM.CG PRO"/>
                   <a:cs typeface="ADAM.CG PRO"/>
                 </a:rPr>
-                <a:t>Stir-fry </a:t>
-              </a:r>
-              <a:r>
-                <a:rPr lang="en-US" sz="2400" b="1" dirty="0" smtClean="0">
-                  <a:latin typeface="ADAM.CG PRO"/>
-                  <a:cs typeface="ADAM.CG PRO"/>
-                </a:rPr>
-                <a:t>Shack</a:t>
+                <a:t>Stir-fry Shack</a:t>
               </a:r>
               <a:endParaRPr lang="en-US" sz="2400" b="1" dirty="0">
                 <a:latin typeface="ADAM.CG PRO"/>
@@ -7448,11 +7441,7 @@
           <a:p>
             <a:r>
               <a:rPr lang="en-US" dirty="0" smtClean="0"/>
-              <a:t>V2 – 3 </a:t>
-            </a:r>
-            <a:r>
-              <a:rPr lang="en-US" dirty="0" smtClean="0"/>
-              <a:t>food trucks</a:t>
+              <a:t>V2 – 3 food trucks</a:t>
             </a:r>
             <a:endParaRPr lang="en-US" dirty="0"/>
           </a:p>
@@ -8494,10 +8483,10 @@
                 </a:custGeom>
                 <a:pattFill prst="ltVert">
                   <a:fgClr>
-                    <a:srgbClr val="EC0506"/>
+                    <a:srgbClr val="B80704"/>
                   </a:fgClr>
                   <a:bgClr>
-                    <a:srgbClr val="FF0000"/>
+                    <a:srgbClr val="EC0506"/>
                   </a:bgClr>
                 </a:pattFill>
                 <a:ln/>

</xml_diff>